<commit_message>
Overview "done" - fleshed out references
</commit_message>
<xml_diff>
--- a/Documentation/Diagrams.pptx
+++ b/Documentation/Diagrams.pptx
@@ -5,12 +5,13 @@
     <p:sldMasterId id="2147483648" r:id="rId1"/>
   </p:sldMasterIdLst>
   <p:notesMasterIdLst>
-    <p:notesMasterId r:id="rId5"/>
+    <p:notesMasterId r:id="rId6"/>
   </p:notesMasterIdLst>
   <p:sldIdLst>
     <p:sldId id="256" r:id="rId2"/>
     <p:sldId id="258" r:id="rId3"/>
     <p:sldId id="259" r:id="rId4"/>
+    <p:sldId id="260" r:id="rId5"/>
   </p:sldIdLst>
   <p:sldSz cx="12192000" cy="6858000"/>
   <p:notesSz cx="6858000" cy="9144000"/>
@@ -6613,6 +6614,450 @@
     <p:extLst>
       <p:ext uri="{BB962C8B-B14F-4D97-AF65-F5344CB8AC3E}">
         <p14:creationId xmlns:p14="http://schemas.microsoft.com/office/powerpoint/2010/main" val="1207004951"/>
+      </p:ext>
+    </p:extLst>
+  </p:cSld>
+  <p:clrMapOvr>
+    <a:masterClrMapping/>
+  </p:clrMapOvr>
+  <p:timing>
+    <p:tnLst>
+      <p:par>
+        <p:cTn id="1" dur="indefinite" restart="never" nodeType="tmRoot"/>
+      </p:par>
+    </p:tnLst>
+  </p:timing>
+</p:sld>
+</file>
+
+<file path=ppt/slides/slide4.xml><?xml version="1.0" encoding="utf-8"?>
+<p:sld xmlns:a="http://schemas.openxmlformats.org/drawingml/2006/main" xmlns:r="http://schemas.openxmlformats.org/officeDocument/2006/relationships" xmlns:p="http://schemas.openxmlformats.org/presentationml/2006/main">
+  <p:cSld>
+    <p:bg>
+      <p:bgPr>
+        <a:solidFill>
+          <a:schemeClr val="bg1">
+            <a:alpha val="0"/>
+          </a:schemeClr>
+        </a:solidFill>
+        <a:effectLst/>
+      </p:bgPr>
+    </p:bg>
+    <p:spTree>
+      <p:nvGrpSpPr>
+        <p:cNvPr id="1" name=""/>
+        <p:cNvGrpSpPr/>
+        <p:nvPr/>
+      </p:nvGrpSpPr>
+      <p:grpSpPr>
+        <a:xfrm>
+          <a:off x="0" y="0"/>
+          <a:ext cx="0" cy="0"/>
+          <a:chOff x="0" y="0"/>
+          <a:chExt cx="0" cy="0"/>
+        </a:xfrm>
+      </p:grpSpPr>
+      <p:sp>
+        <p:nvSpPr>
+          <p:cNvPr id="4" name="Rectangle 3"/>
+          <p:cNvSpPr/>
+          <p:nvPr/>
+        </p:nvSpPr>
+        <p:spPr>
+          <a:xfrm>
+            <a:off x="2885768" y="2003781"/>
+            <a:ext cx="1241224" cy="457593"/>
+          </a:xfrm>
+          <a:prstGeom prst="rect">
+            <a:avLst/>
+          </a:prstGeom>
+        </p:spPr>
+        <p:style>
+          <a:lnRef idx="2">
+            <a:schemeClr val="accent1">
+              <a:shade val="50000"/>
+            </a:schemeClr>
+          </a:lnRef>
+          <a:fillRef idx="1">
+            <a:schemeClr val="accent1"/>
+          </a:fillRef>
+          <a:effectRef idx="0">
+            <a:schemeClr val="accent1"/>
+          </a:effectRef>
+          <a:fontRef idx="minor">
+            <a:schemeClr val="lt1"/>
+          </a:fontRef>
+        </p:style>
+        <p:txBody>
+          <a:bodyPr rtlCol="0" anchor="ctr"/>
+          <a:lstStyle/>
+          <a:p>
+            <a:pPr algn="ctr"/>
+            <a:r>
+              <a:rPr lang="en-US" sz="1400" dirty="0" smtClean="0"/>
+              <a:t>Query</a:t>
+            </a:r>
+          </a:p>
+        </p:txBody>
+      </p:sp>
+      <p:sp>
+        <p:nvSpPr>
+          <p:cNvPr id="5" name="Rectangle 4"/>
+          <p:cNvSpPr/>
+          <p:nvPr/>
+        </p:nvSpPr>
+        <p:spPr>
+          <a:xfrm>
+            <a:off x="2785872" y="1702347"/>
+            <a:ext cx="1441016" cy="2454527"/>
+          </a:xfrm>
+          <a:prstGeom prst="rect">
+            <a:avLst/>
+          </a:prstGeom>
+          <a:noFill/>
+          <a:ln>
+            <a:solidFill>
+              <a:schemeClr val="bg2">
+                <a:lumMod val="75000"/>
+              </a:schemeClr>
+            </a:solidFill>
+            <a:prstDash val="sysDash"/>
+          </a:ln>
+        </p:spPr>
+        <p:style>
+          <a:lnRef idx="2">
+            <a:schemeClr val="accent1">
+              <a:shade val="50000"/>
+            </a:schemeClr>
+          </a:lnRef>
+          <a:fillRef idx="1">
+            <a:schemeClr val="accent1"/>
+          </a:fillRef>
+          <a:effectRef idx="0">
+            <a:schemeClr val="accent1"/>
+          </a:effectRef>
+          <a:fontRef idx="minor">
+            <a:schemeClr val="lt1"/>
+          </a:fontRef>
+        </p:style>
+        <p:txBody>
+          <a:bodyPr rtlCol="0" anchor="t" anchorCtr="0"/>
+          <a:lstStyle/>
+          <a:p>
+            <a:r>
+              <a:rPr lang="en-US" sz="1400" dirty="0" smtClean="0">
+                <a:solidFill>
+                  <a:schemeClr val="bg2">
+                    <a:lumMod val="75000"/>
+                  </a:schemeClr>
+                </a:solidFill>
+              </a:rPr>
+              <a:t>Read</a:t>
+            </a:r>
+            <a:endParaRPr lang="en-US" sz="1400" dirty="0">
+              <a:solidFill>
+                <a:schemeClr val="bg2">
+                  <a:lumMod val="75000"/>
+                </a:schemeClr>
+              </a:solidFill>
+            </a:endParaRPr>
+          </a:p>
+        </p:txBody>
+      </p:sp>
+      <p:sp>
+        <p:nvSpPr>
+          <p:cNvPr id="6" name="Rectangle 5"/>
+          <p:cNvSpPr/>
+          <p:nvPr/>
+        </p:nvSpPr>
+        <p:spPr>
+          <a:xfrm>
+            <a:off x="4326784" y="1702346"/>
+            <a:ext cx="1438656" cy="2454528"/>
+          </a:xfrm>
+          <a:prstGeom prst="rect">
+            <a:avLst/>
+          </a:prstGeom>
+          <a:noFill/>
+          <a:ln>
+            <a:solidFill>
+              <a:schemeClr val="bg2">
+                <a:lumMod val="75000"/>
+              </a:schemeClr>
+            </a:solidFill>
+            <a:prstDash val="sysDash"/>
+          </a:ln>
+        </p:spPr>
+        <p:style>
+          <a:lnRef idx="2">
+            <a:schemeClr val="accent1">
+              <a:shade val="50000"/>
+            </a:schemeClr>
+          </a:lnRef>
+          <a:fillRef idx="1">
+            <a:schemeClr val="accent1"/>
+          </a:fillRef>
+          <a:effectRef idx="0">
+            <a:schemeClr val="accent1"/>
+          </a:effectRef>
+          <a:fontRef idx="minor">
+            <a:schemeClr val="lt1"/>
+          </a:fontRef>
+        </p:style>
+        <p:txBody>
+          <a:bodyPr rtlCol="0" anchor="t" anchorCtr="0"/>
+          <a:lstStyle/>
+          <a:p>
+            <a:r>
+              <a:rPr lang="en-US" sz="1400" dirty="0" smtClean="0">
+                <a:solidFill>
+                  <a:schemeClr val="bg2">
+                    <a:lumMod val="75000"/>
+                  </a:schemeClr>
+                </a:solidFill>
+              </a:rPr>
+              <a:t>Write</a:t>
+            </a:r>
+            <a:endParaRPr lang="en-US" sz="1400" dirty="0">
+              <a:solidFill>
+                <a:schemeClr val="bg2">
+                  <a:lumMod val="75000"/>
+                </a:schemeClr>
+              </a:solidFill>
+            </a:endParaRPr>
+          </a:p>
+        </p:txBody>
+      </p:sp>
+      <p:sp>
+        <p:nvSpPr>
+          <p:cNvPr id="7" name="Can 6"/>
+          <p:cNvSpPr/>
+          <p:nvPr/>
+        </p:nvSpPr>
+        <p:spPr>
+          <a:xfrm>
+            <a:off x="3097948" y="3064241"/>
+            <a:ext cx="816864" cy="999744"/>
+          </a:xfrm>
+          <a:prstGeom prst="can">
+            <a:avLst/>
+          </a:prstGeom>
+        </p:spPr>
+        <p:style>
+          <a:lnRef idx="2">
+            <a:schemeClr val="accent1">
+              <a:shade val="50000"/>
+            </a:schemeClr>
+          </a:lnRef>
+          <a:fillRef idx="1">
+            <a:schemeClr val="accent1"/>
+          </a:fillRef>
+          <a:effectRef idx="0">
+            <a:schemeClr val="accent1"/>
+          </a:effectRef>
+          <a:fontRef idx="minor">
+            <a:schemeClr val="lt1"/>
+          </a:fontRef>
+        </p:style>
+        <p:txBody>
+          <a:bodyPr rtlCol="0" anchor="ctr"/>
+          <a:lstStyle/>
+          <a:p>
+            <a:pPr algn="ctr"/>
+            <a:r>
+              <a:rPr lang="en-US" sz="1600" dirty="0" smtClean="0"/>
+              <a:t>Read Models</a:t>
+            </a:r>
+            <a:endParaRPr lang="en-US" sz="1600" dirty="0"/>
+          </a:p>
+        </p:txBody>
+      </p:sp>
+      <p:sp>
+        <p:nvSpPr>
+          <p:cNvPr id="8" name="Rectangle 7"/>
+          <p:cNvSpPr/>
+          <p:nvPr/>
+        </p:nvSpPr>
+        <p:spPr>
+          <a:xfrm>
+            <a:off x="2885768" y="2534011"/>
+            <a:ext cx="1241224" cy="457593"/>
+          </a:xfrm>
+          <a:prstGeom prst="rect">
+            <a:avLst/>
+          </a:prstGeom>
+        </p:spPr>
+        <p:style>
+          <a:lnRef idx="2">
+            <a:schemeClr val="accent1">
+              <a:shade val="50000"/>
+            </a:schemeClr>
+          </a:lnRef>
+          <a:fillRef idx="1">
+            <a:schemeClr val="accent1"/>
+          </a:fillRef>
+          <a:effectRef idx="0">
+            <a:schemeClr val="accent1"/>
+          </a:effectRef>
+          <a:fontRef idx="minor">
+            <a:schemeClr val="lt1"/>
+          </a:fontRef>
+        </p:style>
+        <p:txBody>
+          <a:bodyPr rtlCol="0" anchor="ctr"/>
+          <a:lstStyle/>
+          <a:p>
+            <a:pPr algn="ctr"/>
+            <a:r>
+              <a:rPr lang="en-US" sz="1400" dirty="0" err="1" smtClean="0"/>
+              <a:t>ReadModel</a:t>
+            </a:r>
+            <a:endParaRPr lang="en-US" sz="1400" dirty="0" smtClean="0"/>
+          </a:p>
+        </p:txBody>
+      </p:sp>
+      <p:sp>
+        <p:nvSpPr>
+          <p:cNvPr id="9" name="Rectangle 8"/>
+          <p:cNvSpPr/>
+          <p:nvPr/>
+        </p:nvSpPr>
+        <p:spPr>
+          <a:xfrm>
+            <a:off x="4425500" y="2003781"/>
+            <a:ext cx="1241224" cy="457593"/>
+          </a:xfrm>
+          <a:prstGeom prst="rect">
+            <a:avLst/>
+          </a:prstGeom>
+        </p:spPr>
+        <p:style>
+          <a:lnRef idx="2">
+            <a:schemeClr val="accent1">
+              <a:shade val="50000"/>
+            </a:schemeClr>
+          </a:lnRef>
+          <a:fillRef idx="1">
+            <a:schemeClr val="accent1"/>
+          </a:fillRef>
+          <a:effectRef idx="0">
+            <a:schemeClr val="accent1"/>
+          </a:effectRef>
+          <a:fontRef idx="minor">
+            <a:schemeClr val="lt1"/>
+          </a:fontRef>
+        </p:style>
+        <p:txBody>
+          <a:bodyPr rtlCol="0" anchor="ctr"/>
+          <a:lstStyle/>
+          <a:p>
+            <a:pPr algn="ctr"/>
+            <a:r>
+              <a:rPr lang="en-US" sz="1400" dirty="0" smtClean="0"/>
+              <a:t>Command</a:t>
+            </a:r>
+          </a:p>
+        </p:txBody>
+      </p:sp>
+      <p:sp>
+        <p:nvSpPr>
+          <p:cNvPr id="10" name="Can 9"/>
+          <p:cNvSpPr/>
+          <p:nvPr/>
+        </p:nvSpPr>
+        <p:spPr>
+          <a:xfrm>
+            <a:off x="4637680" y="3064241"/>
+            <a:ext cx="816864" cy="999744"/>
+          </a:xfrm>
+          <a:prstGeom prst="can">
+            <a:avLst/>
+          </a:prstGeom>
+        </p:spPr>
+        <p:style>
+          <a:lnRef idx="2">
+            <a:schemeClr val="accent1">
+              <a:shade val="50000"/>
+            </a:schemeClr>
+          </a:lnRef>
+          <a:fillRef idx="1">
+            <a:schemeClr val="accent1"/>
+          </a:fillRef>
+          <a:effectRef idx="0">
+            <a:schemeClr val="accent1"/>
+          </a:effectRef>
+          <a:fontRef idx="minor">
+            <a:schemeClr val="lt1"/>
+          </a:fontRef>
+        </p:style>
+        <p:txBody>
+          <a:bodyPr rtlCol="0" anchor="ctr"/>
+          <a:lstStyle/>
+          <a:p>
+            <a:pPr algn="ctr"/>
+            <a:r>
+              <a:rPr lang="en-US" sz="1600" dirty="0" smtClean="0"/>
+              <a:t>Write</a:t>
+            </a:r>
+          </a:p>
+          <a:p>
+            <a:pPr algn="ctr"/>
+            <a:r>
+              <a:rPr lang="en-US" sz="1600" dirty="0" smtClean="0"/>
+              <a:t>Models</a:t>
+            </a:r>
+            <a:endParaRPr lang="en-US" sz="1600" dirty="0"/>
+          </a:p>
+        </p:txBody>
+      </p:sp>
+      <p:sp>
+        <p:nvSpPr>
+          <p:cNvPr id="11" name="Rectangle 10"/>
+          <p:cNvSpPr/>
+          <p:nvPr/>
+        </p:nvSpPr>
+        <p:spPr>
+          <a:xfrm>
+            <a:off x="4425500" y="2534011"/>
+            <a:ext cx="1241224" cy="457593"/>
+          </a:xfrm>
+          <a:prstGeom prst="rect">
+            <a:avLst/>
+          </a:prstGeom>
+        </p:spPr>
+        <p:style>
+          <a:lnRef idx="2">
+            <a:schemeClr val="accent1">
+              <a:shade val="50000"/>
+            </a:schemeClr>
+          </a:lnRef>
+          <a:fillRef idx="1">
+            <a:schemeClr val="accent1"/>
+          </a:fillRef>
+          <a:effectRef idx="0">
+            <a:schemeClr val="accent1"/>
+          </a:effectRef>
+          <a:fontRef idx="minor">
+            <a:schemeClr val="lt1"/>
+          </a:fontRef>
+        </p:style>
+        <p:txBody>
+          <a:bodyPr rtlCol="0" anchor="ctr"/>
+          <a:lstStyle/>
+          <a:p>
+            <a:pPr algn="ctr"/>
+            <a:r>
+              <a:rPr lang="en-US" sz="1400" dirty="0" err="1" smtClean="0"/>
+              <a:t>WriteModel</a:t>
+            </a:r>
+            <a:endParaRPr lang="en-US" sz="1400" dirty="0" smtClean="0"/>
+          </a:p>
+        </p:txBody>
+      </p:sp>
+    </p:spTree>
+    <p:extLst>
+      <p:ext uri="{BB962C8B-B14F-4D97-AF65-F5344CB8AC3E}">
+        <p14:creationId xmlns:p14="http://schemas.microsoft.com/office/powerpoint/2010/main" val="1712119131"/>
       </p:ext>
     </p:extLst>
   </p:cSld>

</xml_diff>

<commit_message>
Started fleshing out regions
</commit_message>
<xml_diff>
--- a/Documentation/Diagrams.pptx
+++ b/Documentation/Diagrams.pptx
@@ -5,13 +5,14 @@
     <p:sldMasterId id="2147483648" r:id="rId1"/>
   </p:sldMasterIdLst>
   <p:notesMasterIdLst>
-    <p:notesMasterId r:id="rId6"/>
+    <p:notesMasterId r:id="rId7"/>
   </p:notesMasterIdLst>
   <p:sldIdLst>
     <p:sldId id="256" r:id="rId2"/>
     <p:sldId id="258" r:id="rId3"/>
     <p:sldId id="259" r:id="rId4"/>
     <p:sldId id="260" r:id="rId5"/>
+    <p:sldId id="261" r:id="rId6"/>
   </p:sldIdLst>
   <p:sldSz cx="12192000" cy="6858000"/>
   <p:notesSz cx="6858000" cy="9144000"/>
@@ -110,6 +111,11 @@
       </a:defRPr>
     </a:lvl9pPr>
   </p:defaultTextStyle>
+  <p:extLst>
+    <p:ext uri="{EFAFB233-063F-42B5-8137-9DF3F51BA10A}">
+      <p15:sldGuideLst xmlns:p15="http://schemas.microsoft.com/office/powerpoint/2012/main"/>
+    </p:ext>
+  </p:extLst>
 </p:presentation>
 </file>
 
@@ -195,7 +201,7 @@
           <a:p>
             <a:fld id="{6515D0F6-CC3D-D444-BC74-B0BFD73CADC1}" type="datetimeFigureOut">
               <a:rPr lang="en-US" smtClean="0"/>
-              <a:t>12/27/16</a:t>
+              <a:t>1/15/17</a:t>
             </a:fld>
             <a:endParaRPr lang="en-US"/>
           </a:p>
@@ -846,7 +852,7 @@
           <a:p>
             <a:fld id="{51BE259D-73B4-BE4F-B370-4EF591E94350}" type="datetimeFigureOut">
               <a:rPr lang="en-US" smtClean="0"/>
-              <a:t>12/27/16</a:t>
+              <a:t>1/15/17</a:t>
             </a:fld>
             <a:endParaRPr lang="en-US"/>
           </a:p>
@@ -1016,7 +1022,7 @@
           <a:p>
             <a:fld id="{51BE259D-73B4-BE4F-B370-4EF591E94350}" type="datetimeFigureOut">
               <a:rPr lang="en-US" smtClean="0"/>
-              <a:t>12/27/16</a:t>
+              <a:t>1/15/17</a:t>
             </a:fld>
             <a:endParaRPr lang="en-US"/>
           </a:p>
@@ -1196,7 +1202,7 @@
           <a:p>
             <a:fld id="{51BE259D-73B4-BE4F-B370-4EF591E94350}" type="datetimeFigureOut">
               <a:rPr lang="en-US" smtClean="0"/>
-              <a:t>12/27/16</a:t>
+              <a:t>1/15/17</a:t>
             </a:fld>
             <a:endParaRPr lang="en-US"/>
           </a:p>
@@ -1366,7 +1372,7 @@
           <a:p>
             <a:fld id="{51BE259D-73B4-BE4F-B370-4EF591E94350}" type="datetimeFigureOut">
               <a:rPr lang="en-US" smtClean="0"/>
-              <a:t>12/27/16</a:t>
+              <a:t>1/15/17</a:t>
             </a:fld>
             <a:endParaRPr lang="en-US"/>
           </a:p>
@@ -1612,7 +1618,7 @@
           <a:p>
             <a:fld id="{51BE259D-73B4-BE4F-B370-4EF591E94350}" type="datetimeFigureOut">
               <a:rPr lang="en-US" smtClean="0"/>
-              <a:t>12/27/16</a:t>
+              <a:t>1/15/17</a:t>
             </a:fld>
             <a:endParaRPr lang="en-US"/>
           </a:p>
@@ -1844,7 +1850,7 @@
           <a:p>
             <a:fld id="{51BE259D-73B4-BE4F-B370-4EF591E94350}" type="datetimeFigureOut">
               <a:rPr lang="en-US" smtClean="0"/>
-              <a:t>12/27/16</a:t>
+              <a:t>1/15/17</a:t>
             </a:fld>
             <a:endParaRPr lang="en-US"/>
           </a:p>
@@ -2211,7 +2217,7 @@
           <a:p>
             <a:fld id="{51BE259D-73B4-BE4F-B370-4EF591E94350}" type="datetimeFigureOut">
               <a:rPr lang="en-US" smtClean="0"/>
-              <a:t>12/27/16</a:t>
+              <a:t>1/15/17</a:t>
             </a:fld>
             <a:endParaRPr lang="en-US"/>
           </a:p>
@@ -2329,7 +2335,7 @@
           <a:p>
             <a:fld id="{51BE259D-73B4-BE4F-B370-4EF591E94350}" type="datetimeFigureOut">
               <a:rPr lang="en-US" smtClean="0"/>
-              <a:t>12/27/16</a:t>
+              <a:t>1/15/17</a:t>
             </a:fld>
             <a:endParaRPr lang="en-US"/>
           </a:p>
@@ -2424,7 +2430,7 @@
           <a:p>
             <a:fld id="{51BE259D-73B4-BE4F-B370-4EF591E94350}" type="datetimeFigureOut">
               <a:rPr lang="en-US" smtClean="0"/>
-              <a:t>12/27/16</a:t>
+              <a:t>1/15/17</a:t>
             </a:fld>
             <a:endParaRPr lang="en-US"/>
           </a:p>
@@ -2701,7 +2707,7 @@
           <a:p>
             <a:fld id="{51BE259D-73B4-BE4F-B370-4EF591E94350}" type="datetimeFigureOut">
               <a:rPr lang="en-US" smtClean="0"/>
-              <a:t>12/27/16</a:t>
+              <a:t>1/15/17</a:t>
             </a:fld>
             <a:endParaRPr lang="en-US"/>
           </a:p>
@@ -2954,7 +2960,7 @@
           <a:p>
             <a:fld id="{51BE259D-73B4-BE4F-B370-4EF591E94350}" type="datetimeFigureOut">
               <a:rPr lang="en-US" smtClean="0"/>
-              <a:t>12/27/16</a:t>
+              <a:t>1/15/17</a:t>
             </a:fld>
             <a:endParaRPr lang="en-US"/>
           </a:p>
@@ -3167,7 +3173,7 @@
           <a:p>
             <a:fld id="{51BE259D-73B4-BE4F-B370-4EF591E94350}" type="datetimeFigureOut">
               <a:rPr lang="en-US" smtClean="0"/>
-              <a:t>12/27/16</a:t>
+              <a:t>1/15/17</a:t>
             </a:fld>
             <a:endParaRPr lang="en-US"/>
           </a:p>
@@ -7071,6 +7077,371 @@
       </p:par>
     </p:tnLst>
   </p:timing>
+</p:sld>
+</file>
+
+<file path=ppt/slides/slide5.xml><?xml version="1.0" encoding="utf-8"?>
+<p:sld xmlns:a="http://schemas.openxmlformats.org/drawingml/2006/main" xmlns:r="http://schemas.openxmlformats.org/officeDocument/2006/relationships" xmlns:p="http://schemas.openxmlformats.org/presentationml/2006/main">
+  <p:cSld>
+    <p:spTree>
+      <p:nvGrpSpPr>
+        <p:cNvPr id="1" name=""/>
+        <p:cNvGrpSpPr/>
+        <p:nvPr/>
+      </p:nvGrpSpPr>
+      <p:grpSpPr>
+        <a:xfrm>
+          <a:off x="0" y="0"/>
+          <a:ext cx="0" cy="0"/>
+          <a:chOff x="0" y="0"/>
+          <a:chExt cx="0" cy="0"/>
+        </a:xfrm>
+      </p:grpSpPr>
+      <p:sp>
+        <p:nvSpPr>
+          <p:cNvPr id="6" name="Rectangle 5"/>
+          <p:cNvSpPr/>
+          <p:nvPr/>
+        </p:nvSpPr>
+        <p:spPr>
+          <a:xfrm>
+            <a:off x="1288616" y="906501"/>
+            <a:ext cx="4466008" cy="2860827"/>
+          </a:xfrm>
+          <a:prstGeom prst="rect">
+            <a:avLst/>
+          </a:prstGeom>
+        </p:spPr>
+        <p:style>
+          <a:lnRef idx="2">
+            <a:schemeClr val="accent1">
+              <a:shade val="50000"/>
+            </a:schemeClr>
+          </a:lnRef>
+          <a:fillRef idx="1">
+            <a:schemeClr val="accent1"/>
+          </a:fillRef>
+          <a:effectRef idx="0">
+            <a:schemeClr val="accent1"/>
+          </a:effectRef>
+          <a:fontRef idx="minor">
+            <a:schemeClr val="lt1"/>
+          </a:fontRef>
+        </p:style>
+        <p:txBody>
+          <a:bodyPr rtlCol="0" anchor="t" anchorCtr="0"/>
+          <a:lstStyle/>
+          <a:p>
+            <a:r>
+              <a:rPr lang="en-US" sz="1400" dirty="0" smtClean="0"/>
+              <a:t>Top Level</a:t>
+            </a:r>
+            <a:endParaRPr lang="en-US" sz="1400" dirty="0" smtClean="0"/>
+          </a:p>
+        </p:txBody>
+      </p:sp>
+      <p:sp>
+        <p:nvSpPr>
+          <p:cNvPr id="4" name="Rectangle 3"/>
+          <p:cNvSpPr/>
+          <p:nvPr/>
+        </p:nvSpPr>
+        <p:spPr>
+          <a:xfrm>
+            <a:off x="1357253" y="1296807"/>
+            <a:ext cx="1241224" cy="457593"/>
+          </a:xfrm>
+          <a:prstGeom prst="rect">
+            <a:avLst/>
+          </a:prstGeom>
+          <a:solidFill>
+            <a:schemeClr val="accent2">
+              <a:lumMod val="60000"/>
+              <a:lumOff val="40000"/>
+            </a:schemeClr>
+          </a:solidFill>
+        </p:spPr>
+        <p:style>
+          <a:lnRef idx="2">
+            <a:schemeClr val="accent1">
+              <a:shade val="50000"/>
+            </a:schemeClr>
+          </a:lnRef>
+          <a:fillRef idx="1">
+            <a:schemeClr val="accent1"/>
+          </a:fillRef>
+          <a:effectRef idx="0">
+            <a:schemeClr val="accent1"/>
+          </a:effectRef>
+          <a:fontRef idx="minor">
+            <a:schemeClr val="lt1"/>
+          </a:fontRef>
+        </p:style>
+        <p:txBody>
+          <a:bodyPr rtlCol="0" anchor="ctr"/>
+          <a:lstStyle/>
+          <a:p>
+            <a:pPr algn="ctr"/>
+            <a:r>
+              <a:rPr lang="en-US" sz="1400" dirty="0" smtClean="0"/>
+              <a:t>View</a:t>
+            </a:r>
+            <a:endParaRPr lang="en-US" sz="1400" dirty="0"/>
+          </a:p>
+        </p:txBody>
+      </p:sp>
+      <p:sp>
+        <p:nvSpPr>
+          <p:cNvPr id="5" name="Rectangle 4"/>
+          <p:cNvSpPr/>
+          <p:nvPr/>
+        </p:nvSpPr>
+        <p:spPr>
+          <a:xfrm>
+            <a:off x="2667114" y="1296807"/>
+            <a:ext cx="1241224" cy="457593"/>
+          </a:xfrm>
+          <a:prstGeom prst="rect">
+            <a:avLst/>
+          </a:prstGeom>
+          <a:solidFill>
+            <a:schemeClr val="accent2">
+              <a:lumMod val="40000"/>
+              <a:lumOff val="60000"/>
+            </a:schemeClr>
+          </a:solidFill>
+        </p:spPr>
+        <p:style>
+          <a:lnRef idx="2">
+            <a:schemeClr val="accent1">
+              <a:shade val="50000"/>
+            </a:schemeClr>
+          </a:lnRef>
+          <a:fillRef idx="1">
+            <a:schemeClr val="accent1"/>
+          </a:fillRef>
+          <a:effectRef idx="0">
+            <a:schemeClr val="accent1"/>
+          </a:effectRef>
+          <a:fontRef idx="minor">
+            <a:schemeClr val="lt1"/>
+          </a:fontRef>
+        </p:style>
+        <p:txBody>
+          <a:bodyPr rtlCol="0" anchor="ctr"/>
+          <a:lstStyle/>
+          <a:p>
+            <a:pPr algn="ctr"/>
+            <a:r>
+              <a:rPr lang="en-US" sz="1400" dirty="0" err="1" smtClean="0"/>
+              <a:t>ViewModel</a:t>
+            </a:r>
+            <a:endParaRPr lang="en-US" sz="1400" dirty="0"/>
+          </a:p>
+        </p:txBody>
+      </p:sp>
+      <p:sp>
+        <p:nvSpPr>
+          <p:cNvPr id="8" name="Rectangle 7"/>
+          <p:cNvSpPr/>
+          <p:nvPr/>
+        </p:nvSpPr>
+        <p:spPr>
+          <a:xfrm>
+            <a:off x="1357252" y="1828800"/>
+            <a:ext cx="2551086" cy="1804416"/>
+          </a:xfrm>
+          <a:prstGeom prst="rect">
+            <a:avLst/>
+          </a:prstGeom>
+          <a:solidFill>
+            <a:srgbClr val="00B0F0"/>
+          </a:solidFill>
+        </p:spPr>
+        <p:style>
+          <a:lnRef idx="2">
+            <a:schemeClr val="accent1">
+              <a:shade val="50000"/>
+            </a:schemeClr>
+          </a:lnRef>
+          <a:fillRef idx="1">
+            <a:schemeClr val="accent1"/>
+          </a:fillRef>
+          <a:effectRef idx="0">
+            <a:schemeClr val="accent1"/>
+          </a:effectRef>
+          <a:fontRef idx="minor">
+            <a:schemeClr val="lt1"/>
+          </a:fontRef>
+        </p:style>
+        <p:txBody>
+          <a:bodyPr rtlCol="0" anchor="t" anchorCtr="0"/>
+          <a:lstStyle/>
+          <a:p>
+            <a:r>
+              <a:rPr lang="en-US" sz="1400" dirty="0" smtClean="0"/>
+              <a:t>Feature 1</a:t>
+            </a:r>
+            <a:endParaRPr lang="en-US" sz="1400" dirty="0" smtClean="0"/>
+          </a:p>
+        </p:txBody>
+      </p:sp>
+      <p:sp>
+        <p:nvSpPr>
+          <p:cNvPr id="9" name="Rectangle 8"/>
+          <p:cNvSpPr/>
+          <p:nvPr/>
+        </p:nvSpPr>
+        <p:spPr>
+          <a:xfrm>
+            <a:off x="1425889" y="2144706"/>
+            <a:ext cx="1172587" cy="457593"/>
+          </a:xfrm>
+          <a:prstGeom prst="rect">
+            <a:avLst/>
+          </a:prstGeom>
+          <a:solidFill>
+            <a:schemeClr val="accent2">
+              <a:lumMod val="60000"/>
+              <a:lumOff val="40000"/>
+            </a:schemeClr>
+          </a:solidFill>
+        </p:spPr>
+        <p:style>
+          <a:lnRef idx="2">
+            <a:schemeClr val="accent1">
+              <a:shade val="50000"/>
+            </a:schemeClr>
+          </a:lnRef>
+          <a:fillRef idx="1">
+            <a:schemeClr val="accent1"/>
+          </a:fillRef>
+          <a:effectRef idx="0">
+            <a:schemeClr val="accent1"/>
+          </a:effectRef>
+          <a:fontRef idx="minor">
+            <a:schemeClr val="lt1"/>
+          </a:fontRef>
+        </p:style>
+        <p:txBody>
+          <a:bodyPr rtlCol="0" anchor="ctr"/>
+          <a:lstStyle/>
+          <a:p>
+            <a:pPr algn="ctr"/>
+            <a:r>
+              <a:rPr lang="en-US" sz="1400" dirty="0" smtClean="0"/>
+              <a:t>View</a:t>
+            </a:r>
+            <a:endParaRPr lang="en-US" sz="1400" dirty="0"/>
+          </a:p>
+        </p:txBody>
+      </p:sp>
+      <p:sp>
+        <p:nvSpPr>
+          <p:cNvPr id="10" name="Rectangle 9"/>
+          <p:cNvSpPr/>
+          <p:nvPr/>
+        </p:nvSpPr>
+        <p:spPr>
+          <a:xfrm>
+            <a:off x="2661952" y="2144705"/>
+            <a:ext cx="1182910" cy="457593"/>
+          </a:xfrm>
+          <a:prstGeom prst="rect">
+            <a:avLst/>
+          </a:prstGeom>
+          <a:solidFill>
+            <a:schemeClr val="accent2">
+              <a:lumMod val="40000"/>
+              <a:lumOff val="60000"/>
+            </a:schemeClr>
+          </a:solidFill>
+        </p:spPr>
+        <p:style>
+          <a:lnRef idx="2">
+            <a:schemeClr val="accent1">
+              <a:shade val="50000"/>
+            </a:schemeClr>
+          </a:lnRef>
+          <a:fillRef idx="1">
+            <a:schemeClr val="accent1"/>
+          </a:fillRef>
+          <a:effectRef idx="0">
+            <a:schemeClr val="accent1"/>
+          </a:effectRef>
+          <a:fontRef idx="minor">
+            <a:schemeClr val="lt1"/>
+          </a:fontRef>
+        </p:style>
+        <p:txBody>
+          <a:bodyPr rtlCol="0" anchor="ctr"/>
+          <a:lstStyle/>
+          <a:p>
+            <a:pPr algn="ctr"/>
+            <a:r>
+              <a:rPr lang="en-US" sz="1400" dirty="0" err="1" smtClean="0"/>
+              <a:t>ViewModel</a:t>
+            </a:r>
+            <a:endParaRPr lang="en-US" sz="1400" dirty="0"/>
+          </a:p>
+        </p:txBody>
+      </p:sp>
+      <p:sp>
+        <p:nvSpPr>
+          <p:cNvPr id="11" name="Rectangle 10"/>
+          <p:cNvSpPr/>
+          <p:nvPr/>
+        </p:nvSpPr>
+        <p:spPr>
+          <a:xfrm>
+            <a:off x="1425888" y="2676699"/>
+            <a:ext cx="2418974" cy="847898"/>
+          </a:xfrm>
+          <a:prstGeom prst="rect">
+            <a:avLst/>
+          </a:prstGeom>
+          <a:solidFill>
+            <a:srgbClr val="00B0F0"/>
+          </a:solidFill>
+        </p:spPr>
+        <p:style>
+          <a:lnRef idx="2">
+            <a:schemeClr val="accent1">
+              <a:shade val="50000"/>
+            </a:schemeClr>
+          </a:lnRef>
+          <a:fillRef idx="1">
+            <a:schemeClr val="accent1"/>
+          </a:fillRef>
+          <a:effectRef idx="0">
+            <a:schemeClr val="accent1"/>
+          </a:effectRef>
+          <a:fontRef idx="minor">
+            <a:schemeClr val="lt1"/>
+          </a:fontRef>
+        </p:style>
+        <p:txBody>
+          <a:bodyPr rtlCol="0" anchor="t" anchorCtr="0"/>
+          <a:lstStyle/>
+          <a:p>
+            <a:r>
+              <a:rPr lang="en-US" sz="1400" dirty="0" smtClean="0"/>
+              <a:t>Feature 1</a:t>
+            </a:r>
+            <a:endParaRPr lang="en-US" sz="1400" dirty="0" smtClean="0"/>
+          </a:p>
+        </p:txBody>
+      </p:sp>
+    </p:spTree>
+    <p:extLst>
+      <p:ext uri="{BB962C8B-B14F-4D97-AF65-F5344CB8AC3E}">
+        <p14:creationId xmlns:p14="http://schemas.microsoft.com/office/powerpoint/2010/main" val="564087549"/>
+      </p:ext>
+    </p:extLst>
+  </p:cSld>
+  <p:clrMapOvr>
+    <a:masterClrMapping/>
+  </p:clrMapOvr>
 </p:sld>
 </file>
 

</xml_diff>

<commit_message>
Updated diagram for regions
</commit_message>
<xml_diff>
--- a/Documentation/Diagrams.pptx
+++ b/Documentation/Diagrams.pptx
@@ -201,7 +201,7 @@
           <a:p>
             <a:fld id="{6515D0F6-CC3D-D444-BC74-B0BFD73CADC1}" type="datetimeFigureOut">
               <a:rPr lang="en-US" smtClean="0"/>
-              <a:t>1/15/17</a:t>
+              <a:t>1/16/17</a:t>
             </a:fld>
             <a:endParaRPr lang="en-US"/>
           </a:p>
@@ -852,7 +852,7 @@
           <a:p>
             <a:fld id="{51BE259D-73B4-BE4F-B370-4EF591E94350}" type="datetimeFigureOut">
               <a:rPr lang="en-US" smtClean="0"/>
-              <a:t>1/15/17</a:t>
+              <a:t>1/16/17</a:t>
             </a:fld>
             <a:endParaRPr lang="en-US"/>
           </a:p>
@@ -1022,7 +1022,7 @@
           <a:p>
             <a:fld id="{51BE259D-73B4-BE4F-B370-4EF591E94350}" type="datetimeFigureOut">
               <a:rPr lang="en-US" smtClean="0"/>
-              <a:t>1/15/17</a:t>
+              <a:t>1/16/17</a:t>
             </a:fld>
             <a:endParaRPr lang="en-US"/>
           </a:p>
@@ -1202,7 +1202,7 @@
           <a:p>
             <a:fld id="{51BE259D-73B4-BE4F-B370-4EF591E94350}" type="datetimeFigureOut">
               <a:rPr lang="en-US" smtClean="0"/>
-              <a:t>1/15/17</a:t>
+              <a:t>1/16/17</a:t>
             </a:fld>
             <a:endParaRPr lang="en-US"/>
           </a:p>
@@ -1372,7 +1372,7 @@
           <a:p>
             <a:fld id="{51BE259D-73B4-BE4F-B370-4EF591E94350}" type="datetimeFigureOut">
               <a:rPr lang="en-US" smtClean="0"/>
-              <a:t>1/15/17</a:t>
+              <a:t>1/16/17</a:t>
             </a:fld>
             <a:endParaRPr lang="en-US"/>
           </a:p>
@@ -1618,7 +1618,7 @@
           <a:p>
             <a:fld id="{51BE259D-73B4-BE4F-B370-4EF591E94350}" type="datetimeFigureOut">
               <a:rPr lang="en-US" smtClean="0"/>
-              <a:t>1/15/17</a:t>
+              <a:t>1/16/17</a:t>
             </a:fld>
             <a:endParaRPr lang="en-US"/>
           </a:p>
@@ -1850,7 +1850,7 @@
           <a:p>
             <a:fld id="{51BE259D-73B4-BE4F-B370-4EF591E94350}" type="datetimeFigureOut">
               <a:rPr lang="en-US" smtClean="0"/>
-              <a:t>1/15/17</a:t>
+              <a:t>1/16/17</a:t>
             </a:fld>
             <a:endParaRPr lang="en-US"/>
           </a:p>
@@ -2217,7 +2217,7 @@
           <a:p>
             <a:fld id="{51BE259D-73B4-BE4F-B370-4EF591E94350}" type="datetimeFigureOut">
               <a:rPr lang="en-US" smtClean="0"/>
-              <a:t>1/15/17</a:t>
+              <a:t>1/16/17</a:t>
             </a:fld>
             <a:endParaRPr lang="en-US"/>
           </a:p>
@@ -2335,7 +2335,7 @@
           <a:p>
             <a:fld id="{51BE259D-73B4-BE4F-B370-4EF591E94350}" type="datetimeFigureOut">
               <a:rPr lang="en-US" smtClean="0"/>
-              <a:t>1/15/17</a:t>
+              <a:t>1/16/17</a:t>
             </a:fld>
             <a:endParaRPr lang="en-US"/>
           </a:p>
@@ -2430,7 +2430,7 @@
           <a:p>
             <a:fld id="{51BE259D-73B4-BE4F-B370-4EF591E94350}" type="datetimeFigureOut">
               <a:rPr lang="en-US" smtClean="0"/>
-              <a:t>1/15/17</a:t>
+              <a:t>1/16/17</a:t>
             </a:fld>
             <a:endParaRPr lang="en-US"/>
           </a:p>
@@ -2707,7 +2707,7 @@
           <a:p>
             <a:fld id="{51BE259D-73B4-BE4F-B370-4EF591E94350}" type="datetimeFigureOut">
               <a:rPr lang="en-US" smtClean="0"/>
-              <a:t>1/15/17</a:t>
+              <a:t>1/16/17</a:t>
             </a:fld>
             <a:endParaRPr lang="en-US"/>
           </a:p>
@@ -2960,7 +2960,7 @@
           <a:p>
             <a:fld id="{51BE259D-73B4-BE4F-B370-4EF591E94350}" type="datetimeFigureOut">
               <a:rPr lang="en-US" smtClean="0"/>
-              <a:t>1/15/17</a:t>
+              <a:t>1/16/17</a:t>
             </a:fld>
             <a:endParaRPr lang="en-US"/>
           </a:p>
@@ -3173,7 +3173,7 @@
           <a:p>
             <a:fld id="{51BE259D-73B4-BE4F-B370-4EF591E94350}" type="datetimeFigureOut">
               <a:rPr lang="en-US" smtClean="0"/>
-              <a:t>1/15/17</a:t>
+              <a:t>1/16/17</a:t>
             </a:fld>
             <a:endParaRPr lang="en-US"/>
           </a:p>
@@ -7105,8 +7105,8 @@
         </p:nvSpPr>
         <p:spPr>
           <a:xfrm>
-            <a:off x="1288616" y="906501"/>
-            <a:ext cx="4466008" cy="2860827"/>
+            <a:off x="1292220" y="923042"/>
+            <a:ext cx="5221912" cy="3638910"/>
           </a:xfrm>
           <a:prstGeom prst="rect">
             <a:avLst/>
@@ -7136,7 +7136,6 @@
               <a:rPr lang="en-US" sz="1400" dirty="0" smtClean="0"/>
               <a:t>Top Level</a:t>
             </a:r>
-            <a:endParaRPr lang="en-US" sz="1400" dirty="0" smtClean="0"/>
           </a:p>
         </p:txBody>
       </p:sp>
@@ -7149,7 +7148,7 @@
         <p:spPr>
           <a:xfrm>
             <a:off x="1357253" y="1296807"/>
-            <a:ext cx="1241224" cy="457593"/>
+            <a:ext cx="1877934" cy="457593"/>
           </a:xfrm>
           <a:prstGeom prst="rect">
             <a:avLst/>
@@ -7198,8 +7197,8 @@
         </p:nvSpPr>
         <p:spPr>
           <a:xfrm>
-            <a:off x="2667114" y="1296807"/>
-            <a:ext cx="1241224" cy="457593"/>
+            <a:off x="3300219" y="1296807"/>
+            <a:ext cx="1893573" cy="457593"/>
           </a:xfrm>
           <a:prstGeom prst="rect">
             <a:avLst/>
@@ -7249,7 +7248,7 @@
         <p:spPr>
           <a:xfrm>
             <a:off x="1357252" y="1828800"/>
-            <a:ext cx="2551086" cy="1804416"/>
+            <a:ext cx="3836540" cy="2622620"/>
           </a:xfrm>
           <a:prstGeom prst="rect">
             <a:avLst/>
@@ -7282,7 +7281,6 @@
               <a:rPr lang="en-US" sz="1400" dirty="0" smtClean="0"/>
               <a:t>Feature 1</a:t>
             </a:r>
-            <a:endParaRPr lang="en-US" sz="1400" dirty="0" smtClean="0"/>
           </a:p>
         </p:txBody>
       </p:sp>
@@ -7395,13 +7393,13 @@
         <p:spPr>
           <a:xfrm>
             <a:off x="1425888" y="2676699"/>
-            <a:ext cx="2418974" cy="847898"/>
+            <a:ext cx="2418974" cy="1412980"/>
           </a:xfrm>
           <a:prstGeom prst="rect">
             <a:avLst/>
           </a:prstGeom>
           <a:solidFill>
-            <a:srgbClr val="00B0F0"/>
+            <a:srgbClr val="00D4FF"/>
           </a:solidFill>
         </p:spPr>
         <p:style>
@@ -7426,9 +7424,700 @@
           <a:p>
             <a:r>
               <a:rPr lang="en-US" sz="1400" dirty="0" smtClean="0"/>
-              <a:t>Feature 1</a:t>
+              <a:t>Feature </a:t>
+            </a:r>
+            <a:r>
+              <a:rPr lang="en-US" sz="1400" dirty="0" smtClean="0"/>
+              <a:t>2</a:t>
             </a:r>
             <a:endParaRPr lang="en-US" sz="1400" dirty="0" smtClean="0"/>
+          </a:p>
+        </p:txBody>
+      </p:sp>
+      <p:sp>
+        <p:nvSpPr>
+          <p:cNvPr id="12" name="Rectangle 11"/>
+          <p:cNvSpPr/>
+          <p:nvPr/>
+        </p:nvSpPr>
+        <p:spPr>
+          <a:xfrm>
+            <a:off x="3903176" y="2144704"/>
+            <a:ext cx="1182910" cy="1379893"/>
+          </a:xfrm>
+          <a:prstGeom prst="rect">
+            <a:avLst/>
+          </a:prstGeom>
+          <a:solidFill>
+            <a:schemeClr val="accent3">
+              <a:lumMod val="40000"/>
+              <a:lumOff val="60000"/>
+            </a:schemeClr>
+          </a:solidFill>
+        </p:spPr>
+        <p:style>
+          <a:lnRef idx="2">
+            <a:schemeClr val="accent1">
+              <a:shade val="50000"/>
+            </a:schemeClr>
+          </a:lnRef>
+          <a:fillRef idx="1">
+            <a:schemeClr val="accent1"/>
+          </a:fillRef>
+          <a:effectRef idx="0">
+            <a:schemeClr val="accent1"/>
+          </a:effectRef>
+          <a:fontRef idx="minor">
+            <a:schemeClr val="lt1"/>
+          </a:fontRef>
+        </p:style>
+        <p:txBody>
+          <a:bodyPr rtlCol="0" anchor="t" anchorCtr="0"/>
+          <a:lstStyle/>
+          <a:p>
+            <a:r>
+              <a:rPr lang="en-US" sz="1400" dirty="0" smtClean="0">
+                <a:solidFill>
+                  <a:schemeClr val="tx1"/>
+                </a:solidFill>
+              </a:rPr>
+              <a:t>Properties:</a:t>
+            </a:r>
+          </a:p>
+          <a:p>
+            <a:endParaRPr lang="en-US" sz="1200" dirty="0">
+              <a:solidFill>
+                <a:schemeClr val="tx1"/>
+              </a:solidFill>
+            </a:endParaRPr>
+          </a:p>
+          <a:p>
+            <a:r>
+              <a:rPr lang="en-US" sz="1200" dirty="0" err="1" smtClean="0">
+                <a:solidFill>
+                  <a:schemeClr val="tx1"/>
+                </a:solidFill>
+              </a:rPr>
+              <a:t>isValid</a:t>
+            </a:r>
+            <a:endParaRPr lang="en-US" sz="1200" dirty="0" smtClean="0">
+              <a:solidFill>
+                <a:schemeClr val="tx1"/>
+              </a:solidFill>
+            </a:endParaRPr>
+          </a:p>
+          <a:p>
+            <a:r>
+              <a:rPr lang="en-US" sz="1200" dirty="0" err="1" smtClean="0">
+                <a:solidFill>
+                  <a:schemeClr val="tx1"/>
+                </a:solidFill>
+              </a:rPr>
+              <a:t>hasChanges</a:t>
+            </a:r>
+            <a:endParaRPr lang="en-US" sz="1200" dirty="0" smtClean="0">
+              <a:solidFill>
+                <a:schemeClr val="tx1"/>
+              </a:solidFill>
+            </a:endParaRPr>
+          </a:p>
+          <a:p>
+            <a:r>
+              <a:rPr lang="en-US" sz="1200" dirty="0" err="1" smtClean="0">
+                <a:solidFill>
+                  <a:schemeClr val="tx1"/>
+                </a:solidFill>
+              </a:rPr>
+              <a:t>isLoading</a:t>
+            </a:r>
+            <a:endParaRPr lang="en-US" sz="1200" dirty="0" smtClean="0">
+              <a:solidFill>
+                <a:schemeClr val="tx1"/>
+              </a:solidFill>
+            </a:endParaRPr>
+          </a:p>
+          <a:p>
+            <a:r>
+              <a:rPr lang="en-US" sz="1200" dirty="0" err="1" smtClean="0">
+                <a:solidFill>
+                  <a:schemeClr val="tx1"/>
+                </a:solidFill>
+              </a:rPr>
+              <a:t>isExecuting</a:t>
+            </a:r>
+            <a:endParaRPr lang="en-US" sz="1200" dirty="0" smtClean="0">
+              <a:solidFill>
+                <a:schemeClr val="tx1"/>
+              </a:solidFill>
+            </a:endParaRPr>
+          </a:p>
+          <a:p>
+            <a:r>
+              <a:rPr lang="mr-IN" sz="1200" dirty="0" smtClean="0">
+                <a:solidFill>
+                  <a:schemeClr val="tx1"/>
+                </a:solidFill>
+              </a:rPr>
+              <a:t>…</a:t>
+            </a:r>
+            <a:endParaRPr lang="en-US" sz="1200" dirty="0" smtClean="0">
+              <a:solidFill>
+                <a:schemeClr val="tx1"/>
+              </a:solidFill>
+            </a:endParaRPr>
+          </a:p>
+          <a:p>
+            <a:endParaRPr lang="en-US" sz="1200" dirty="0">
+              <a:solidFill>
+                <a:schemeClr val="tx1"/>
+              </a:solidFill>
+            </a:endParaRPr>
+          </a:p>
+        </p:txBody>
+      </p:sp>
+      <p:sp>
+        <p:nvSpPr>
+          <p:cNvPr id="13" name="Rectangle 12"/>
+          <p:cNvSpPr/>
+          <p:nvPr/>
+        </p:nvSpPr>
+        <p:spPr>
+          <a:xfrm>
+            <a:off x="5258824" y="1296807"/>
+            <a:ext cx="1182910" cy="3154613"/>
+          </a:xfrm>
+          <a:prstGeom prst="rect">
+            <a:avLst/>
+          </a:prstGeom>
+          <a:solidFill>
+            <a:schemeClr val="accent3">
+              <a:lumMod val="40000"/>
+              <a:lumOff val="60000"/>
+            </a:schemeClr>
+          </a:solidFill>
+        </p:spPr>
+        <p:style>
+          <a:lnRef idx="2">
+            <a:schemeClr val="accent1">
+              <a:shade val="50000"/>
+            </a:schemeClr>
+          </a:lnRef>
+          <a:fillRef idx="1">
+            <a:schemeClr val="accent1"/>
+          </a:fillRef>
+          <a:effectRef idx="0">
+            <a:schemeClr val="accent1"/>
+          </a:effectRef>
+          <a:fontRef idx="minor">
+            <a:schemeClr val="lt1"/>
+          </a:fontRef>
+        </p:style>
+        <p:txBody>
+          <a:bodyPr rtlCol="0" anchor="t" anchorCtr="0"/>
+          <a:lstStyle/>
+          <a:p>
+            <a:r>
+              <a:rPr lang="en-US" sz="1400" dirty="0" smtClean="0">
+                <a:solidFill>
+                  <a:schemeClr val="tx1"/>
+                </a:solidFill>
+              </a:rPr>
+              <a:t>Properties:</a:t>
+            </a:r>
+          </a:p>
+          <a:p>
+            <a:endParaRPr lang="en-US" sz="1200" dirty="0">
+              <a:solidFill>
+                <a:schemeClr val="tx1"/>
+              </a:solidFill>
+            </a:endParaRPr>
+          </a:p>
+          <a:p>
+            <a:r>
+              <a:rPr lang="en-US" sz="1200" dirty="0" err="1" smtClean="0">
+                <a:solidFill>
+                  <a:schemeClr val="tx1"/>
+                </a:solidFill>
+              </a:rPr>
+              <a:t>isValid</a:t>
+            </a:r>
+            <a:endParaRPr lang="en-US" sz="1200" dirty="0" smtClean="0">
+              <a:solidFill>
+                <a:schemeClr val="tx1"/>
+              </a:solidFill>
+            </a:endParaRPr>
+          </a:p>
+          <a:p>
+            <a:r>
+              <a:rPr lang="en-US" sz="1200" dirty="0" err="1" smtClean="0">
+                <a:solidFill>
+                  <a:schemeClr val="tx1"/>
+                </a:solidFill>
+              </a:rPr>
+              <a:t>hasChanges</a:t>
+            </a:r>
+            <a:endParaRPr lang="en-US" sz="1200" dirty="0" smtClean="0">
+              <a:solidFill>
+                <a:schemeClr val="tx1"/>
+              </a:solidFill>
+            </a:endParaRPr>
+          </a:p>
+          <a:p>
+            <a:r>
+              <a:rPr lang="en-US" sz="1200" dirty="0" err="1" smtClean="0">
+                <a:solidFill>
+                  <a:schemeClr val="tx1"/>
+                </a:solidFill>
+              </a:rPr>
+              <a:t>isLoading</a:t>
+            </a:r>
+            <a:endParaRPr lang="en-US" sz="1200" dirty="0" smtClean="0">
+              <a:solidFill>
+                <a:schemeClr val="tx1"/>
+              </a:solidFill>
+            </a:endParaRPr>
+          </a:p>
+          <a:p>
+            <a:r>
+              <a:rPr lang="en-US" sz="1200" dirty="0" err="1" smtClean="0">
+                <a:solidFill>
+                  <a:schemeClr val="tx1"/>
+                </a:solidFill>
+              </a:rPr>
+              <a:t>isExecuting</a:t>
+            </a:r>
+            <a:endParaRPr lang="en-US" sz="1200" dirty="0" smtClean="0">
+              <a:solidFill>
+                <a:schemeClr val="tx1"/>
+              </a:solidFill>
+            </a:endParaRPr>
+          </a:p>
+          <a:p>
+            <a:r>
+              <a:rPr lang="mr-IN" sz="1200" dirty="0" smtClean="0">
+                <a:solidFill>
+                  <a:schemeClr val="tx1"/>
+                </a:solidFill>
+              </a:rPr>
+              <a:t>…</a:t>
+            </a:r>
+            <a:endParaRPr lang="en-US" sz="1200" dirty="0" smtClean="0">
+              <a:solidFill>
+                <a:schemeClr val="tx1"/>
+              </a:solidFill>
+            </a:endParaRPr>
+          </a:p>
+          <a:p>
+            <a:endParaRPr lang="en-US" sz="1200" dirty="0">
+              <a:solidFill>
+                <a:schemeClr val="tx1"/>
+              </a:solidFill>
+            </a:endParaRPr>
+          </a:p>
+        </p:txBody>
+      </p:sp>
+      <p:cxnSp>
+        <p:nvCxnSpPr>
+          <p:cNvPr id="16" name="Straight Arrow Connector 15"/>
+          <p:cNvCxnSpPr/>
+          <p:nvPr/>
+        </p:nvCxnSpPr>
+        <p:spPr>
+          <a:xfrm flipV="1">
+            <a:off x="4866501" y="2349107"/>
+            <a:ext cx="439169" cy="253191"/>
+          </a:xfrm>
+          <a:prstGeom prst="straightConnector1">
+            <a:avLst/>
+          </a:prstGeom>
+          <a:ln w="53975">
+            <a:solidFill>
+              <a:schemeClr val="tx1"/>
+            </a:solidFill>
+            <a:tailEnd type="triangle"/>
+          </a:ln>
+        </p:spPr>
+        <p:style>
+          <a:lnRef idx="1">
+            <a:schemeClr val="accent1"/>
+          </a:lnRef>
+          <a:fillRef idx="0">
+            <a:schemeClr val="accent1"/>
+          </a:fillRef>
+          <a:effectRef idx="0">
+            <a:schemeClr val="accent1"/>
+          </a:effectRef>
+          <a:fontRef idx="minor">
+            <a:schemeClr val="tx1"/>
+          </a:fontRef>
+        </p:style>
+      </p:cxnSp>
+      <p:sp>
+        <p:nvSpPr>
+          <p:cNvPr id="18" name="TextBox 17"/>
+          <p:cNvSpPr txBox="1"/>
+          <p:nvPr/>
+        </p:nvSpPr>
+        <p:spPr>
+          <a:xfrm rot="19698751">
+            <a:off x="4494879" y="2245801"/>
+            <a:ext cx="915606" cy="276999"/>
+          </a:xfrm>
+          <a:prstGeom prst="rect">
+            <a:avLst/>
+          </a:prstGeom>
+          <a:noFill/>
+        </p:spPr>
+        <p:txBody>
+          <a:bodyPr wrap="square" rtlCol="0">
+            <a:spAutoFit/>
+          </a:bodyPr>
+          <a:lstStyle/>
+          <a:p>
+            <a:r>
+              <a:rPr lang="en-US" sz="1200" dirty="0" smtClean="0">
+                <a:effectLst>
+                  <a:outerShdw blurRad="50800" dist="76200" dir="2700000" algn="tl" rotWithShape="0">
+                    <a:prstClr val="black">
+                      <a:alpha val="40000"/>
+                    </a:prstClr>
+                  </a:outerShdw>
+                </a:effectLst>
+              </a:rPr>
+              <a:t>Aggregated</a:t>
+            </a:r>
+            <a:endParaRPr lang="en-US" sz="1200" dirty="0">
+              <a:effectLst>
+                <a:outerShdw blurRad="50800" dist="76200" dir="2700000" algn="tl" rotWithShape="0">
+                  <a:prstClr val="black">
+                    <a:alpha val="40000"/>
+                  </a:prstClr>
+                </a:outerShdw>
+              </a:effectLst>
+            </a:endParaRPr>
+          </a:p>
+        </p:txBody>
+      </p:sp>
+      <p:sp>
+        <p:nvSpPr>
+          <p:cNvPr id="19" name="Rectangle 18"/>
+          <p:cNvSpPr/>
+          <p:nvPr/>
+        </p:nvSpPr>
+        <p:spPr>
+          <a:xfrm>
+            <a:off x="1499763" y="2984027"/>
+            <a:ext cx="670681" cy="331929"/>
+          </a:xfrm>
+          <a:prstGeom prst="rect">
+            <a:avLst/>
+          </a:prstGeom>
+          <a:solidFill>
+            <a:schemeClr val="accent2">
+              <a:lumMod val="60000"/>
+              <a:lumOff val="40000"/>
+            </a:schemeClr>
+          </a:solidFill>
+        </p:spPr>
+        <p:style>
+          <a:lnRef idx="2">
+            <a:schemeClr val="accent1">
+              <a:shade val="50000"/>
+            </a:schemeClr>
+          </a:lnRef>
+          <a:fillRef idx="1">
+            <a:schemeClr val="accent1"/>
+          </a:fillRef>
+          <a:effectRef idx="0">
+            <a:schemeClr val="accent1"/>
+          </a:effectRef>
+          <a:fontRef idx="minor">
+            <a:schemeClr val="lt1"/>
+          </a:fontRef>
+        </p:style>
+        <p:txBody>
+          <a:bodyPr rtlCol="0" anchor="ctr"/>
+          <a:lstStyle/>
+          <a:p>
+            <a:pPr algn="ctr"/>
+            <a:r>
+              <a:rPr lang="en-US" sz="1100" dirty="0" smtClean="0"/>
+              <a:t>View</a:t>
+            </a:r>
+            <a:endParaRPr lang="en-US" sz="1400" dirty="0"/>
+          </a:p>
+        </p:txBody>
+      </p:sp>
+      <p:sp>
+        <p:nvSpPr>
+          <p:cNvPr id="20" name="Rectangle 19"/>
+          <p:cNvSpPr/>
+          <p:nvPr/>
+        </p:nvSpPr>
+        <p:spPr>
+          <a:xfrm>
+            <a:off x="2235476" y="2984027"/>
+            <a:ext cx="678675" cy="331929"/>
+          </a:xfrm>
+          <a:prstGeom prst="rect">
+            <a:avLst/>
+          </a:prstGeom>
+          <a:solidFill>
+            <a:schemeClr val="accent2">
+              <a:lumMod val="40000"/>
+              <a:lumOff val="60000"/>
+            </a:schemeClr>
+          </a:solidFill>
+        </p:spPr>
+        <p:style>
+          <a:lnRef idx="2">
+            <a:schemeClr val="accent1">
+              <a:shade val="50000"/>
+            </a:schemeClr>
+          </a:lnRef>
+          <a:fillRef idx="1">
+            <a:schemeClr val="accent1"/>
+          </a:fillRef>
+          <a:effectRef idx="0">
+            <a:schemeClr val="accent1"/>
+          </a:effectRef>
+          <a:fontRef idx="minor">
+            <a:schemeClr val="lt1"/>
+          </a:fontRef>
+        </p:style>
+        <p:txBody>
+          <a:bodyPr rtlCol="0" anchor="ctr"/>
+          <a:lstStyle/>
+          <a:p>
+            <a:pPr algn="ctr"/>
+            <a:r>
+              <a:rPr lang="en-US" sz="800" dirty="0" err="1" smtClean="0"/>
+              <a:t>ViewModel</a:t>
+            </a:r>
+            <a:endParaRPr lang="en-US" sz="800" dirty="0"/>
+          </a:p>
+        </p:txBody>
+      </p:sp>
+      <p:sp>
+        <p:nvSpPr>
+          <p:cNvPr id="21" name="Rectangle 20"/>
+          <p:cNvSpPr/>
+          <p:nvPr/>
+        </p:nvSpPr>
+        <p:spPr>
+          <a:xfrm>
+            <a:off x="2972465" y="2984027"/>
+            <a:ext cx="823005" cy="1015217"/>
+          </a:xfrm>
+          <a:prstGeom prst="rect">
+            <a:avLst/>
+          </a:prstGeom>
+          <a:solidFill>
+            <a:schemeClr val="accent3">
+              <a:lumMod val="40000"/>
+              <a:lumOff val="60000"/>
+            </a:schemeClr>
+          </a:solidFill>
+        </p:spPr>
+        <p:style>
+          <a:lnRef idx="2">
+            <a:schemeClr val="accent1">
+              <a:shade val="50000"/>
+            </a:schemeClr>
+          </a:lnRef>
+          <a:fillRef idx="1">
+            <a:schemeClr val="accent1"/>
+          </a:fillRef>
+          <a:effectRef idx="0">
+            <a:schemeClr val="accent1"/>
+          </a:effectRef>
+          <a:fontRef idx="minor">
+            <a:schemeClr val="lt1"/>
+          </a:fontRef>
+        </p:style>
+        <p:txBody>
+          <a:bodyPr rtlCol="0" anchor="t" anchorCtr="0"/>
+          <a:lstStyle/>
+          <a:p>
+            <a:r>
+              <a:rPr lang="en-US" sz="1000" dirty="0" smtClean="0">
+                <a:solidFill>
+                  <a:schemeClr val="tx1"/>
+                </a:solidFill>
+              </a:rPr>
+              <a:t>Properties:</a:t>
+            </a:r>
+          </a:p>
+          <a:p>
+            <a:endParaRPr lang="en-US" sz="900" dirty="0">
+              <a:solidFill>
+                <a:schemeClr val="tx1"/>
+              </a:solidFill>
+            </a:endParaRPr>
+          </a:p>
+          <a:p>
+            <a:r>
+              <a:rPr lang="en-US" sz="900" dirty="0" err="1" smtClean="0">
+                <a:solidFill>
+                  <a:schemeClr val="tx1"/>
+                </a:solidFill>
+              </a:rPr>
+              <a:t>isValid</a:t>
+            </a:r>
+            <a:endParaRPr lang="en-US" sz="900" dirty="0" smtClean="0">
+              <a:solidFill>
+                <a:schemeClr val="tx1"/>
+              </a:solidFill>
+            </a:endParaRPr>
+          </a:p>
+          <a:p>
+            <a:r>
+              <a:rPr lang="en-US" sz="900" dirty="0" err="1" smtClean="0">
+                <a:solidFill>
+                  <a:schemeClr val="tx1"/>
+                </a:solidFill>
+              </a:rPr>
+              <a:t>hasChanges</a:t>
+            </a:r>
+            <a:endParaRPr lang="en-US" sz="900" dirty="0" smtClean="0">
+              <a:solidFill>
+                <a:schemeClr val="tx1"/>
+              </a:solidFill>
+            </a:endParaRPr>
+          </a:p>
+          <a:p>
+            <a:r>
+              <a:rPr lang="en-US" sz="900" dirty="0" err="1" smtClean="0">
+                <a:solidFill>
+                  <a:schemeClr val="tx1"/>
+                </a:solidFill>
+              </a:rPr>
+              <a:t>isLoading</a:t>
+            </a:r>
+            <a:endParaRPr lang="en-US" sz="900" dirty="0" smtClean="0">
+              <a:solidFill>
+                <a:schemeClr val="tx1"/>
+              </a:solidFill>
+            </a:endParaRPr>
+          </a:p>
+          <a:p>
+            <a:r>
+              <a:rPr lang="en-US" sz="900" dirty="0" err="1" smtClean="0">
+                <a:solidFill>
+                  <a:schemeClr val="tx1"/>
+                </a:solidFill>
+              </a:rPr>
+              <a:t>isExecuting</a:t>
+            </a:r>
+            <a:endParaRPr lang="en-US" sz="900" dirty="0" smtClean="0">
+              <a:solidFill>
+                <a:schemeClr val="tx1"/>
+              </a:solidFill>
+            </a:endParaRPr>
+          </a:p>
+          <a:p>
+            <a:r>
+              <a:rPr lang="mr-IN" sz="900" dirty="0" smtClean="0">
+                <a:solidFill>
+                  <a:schemeClr val="tx1"/>
+                </a:solidFill>
+              </a:rPr>
+              <a:t>…</a:t>
+            </a:r>
+            <a:endParaRPr lang="en-US" sz="900" dirty="0" smtClean="0">
+              <a:solidFill>
+                <a:schemeClr val="tx1"/>
+              </a:solidFill>
+            </a:endParaRPr>
+          </a:p>
+          <a:p>
+            <a:endParaRPr lang="en-US" sz="900" dirty="0">
+              <a:solidFill>
+                <a:schemeClr val="tx1"/>
+              </a:solidFill>
+            </a:endParaRPr>
+          </a:p>
+        </p:txBody>
+      </p:sp>
+      <p:cxnSp>
+        <p:nvCxnSpPr>
+          <p:cNvPr id="22" name="Straight Arrow Connector 21"/>
+          <p:cNvCxnSpPr/>
+          <p:nvPr/>
+        </p:nvCxnSpPr>
+        <p:spPr>
+          <a:xfrm flipV="1">
+            <a:off x="3508528" y="3079309"/>
+            <a:ext cx="439169" cy="253191"/>
+          </a:xfrm>
+          <a:prstGeom prst="straightConnector1">
+            <a:avLst/>
+          </a:prstGeom>
+          <a:ln w="53975">
+            <a:solidFill>
+              <a:schemeClr val="tx1"/>
+            </a:solidFill>
+            <a:tailEnd type="triangle"/>
+          </a:ln>
+        </p:spPr>
+        <p:style>
+          <a:lnRef idx="1">
+            <a:schemeClr val="accent1"/>
+          </a:lnRef>
+          <a:fillRef idx="0">
+            <a:schemeClr val="accent1"/>
+          </a:fillRef>
+          <a:effectRef idx="0">
+            <a:schemeClr val="accent1"/>
+          </a:effectRef>
+          <a:fontRef idx="minor">
+            <a:schemeClr val="tx1"/>
+          </a:fontRef>
+        </p:style>
+      </p:cxnSp>
+      <p:sp>
+        <p:nvSpPr>
+          <p:cNvPr id="23" name="TextBox 22"/>
+          <p:cNvSpPr txBox="1"/>
+          <p:nvPr/>
+        </p:nvSpPr>
+        <p:spPr>
+          <a:xfrm rot="19698751">
+            <a:off x="3136906" y="2976003"/>
+            <a:ext cx="915606" cy="276999"/>
+          </a:xfrm>
+          <a:prstGeom prst="rect">
+            <a:avLst/>
+          </a:prstGeom>
+          <a:noFill/>
+        </p:spPr>
+        <p:txBody>
+          <a:bodyPr wrap="square" rtlCol="0">
+            <a:spAutoFit/>
+          </a:bodyPr>
+          <a:lstStyle/>
+          <a:p>
+            <a:r>
+              <a:rPr lang="en-US" sz="1200" dirty="0" smtClean="0">
+                <a:effectLst>
+                  <a:outerShdw blurRad="50800" dist="76200" dir="2700000" algn="tl" rotWithShape="0">
+                    <a:prstClr val="black">
+                      <a:alpha val="40000"/>
+                    </a:prstClr>
+                  </a:outerShdw>
+                </a:effectLst>
+              </a:rPr>
+              <a:t>Aggregated</a:t>
+            </a:r>
+            <a:endParaRPr lang="en-US" sz="1200" dirty="0">
+              <a:effectLst>
+                <a:outerShdw blurRad="50800" dist="76200" dir="2700000" algn="tl" rotWithShape="0">
+                  <a:prstClr val="black">
+                    <a:alpha val="40000"/>
+                  </a:prstClr>
+                </a:outerShdw>
+              </a:effectLst>
+            </a:endParaRPr>
           </a:p>
         </p:txBody>
       </p:sp>

</xml_diff>

<commit_message>
Putting in more details on Queries
</commit_message>
<xml_diff>
--- a/Documentation/Diagrams.pptx
+++ b/Documentation/Diagrams.pptx
@@ -5,7 +5,7 @@
     <p:sldMasterId id="2147483648" r:id="rId1"/>
   </p:sldMasterIdLst>
   <p:notesMasterIdLst>
-    <p:notesMasterId r:id="rId7"/>
+    <p:notesMasterId r:id="rId8"/>
   </p:notesMasterIdLst>
   <p:sldIdLst>
     <p:sldId id="256" r:id="rId2"/>
@@ -13,6 +13,7 @@
     <p:sldId id="259" r:id="rId4"/>
     <p:sldId id="260" r:id="rId5"/>
     <p:sldId id="261" r:id="rId6"/>
+    <p:sldId id="262" r:id="rId7"/>
   </p:sldIdLst>
   <p:sldSz cx="12192000" cy="6858000"/>
   <p:notesSz cx="6858000" cy="9144000"/>
@@ -201,7 +202,7 @@
           <a:p>
             <a:fld id="{6515D0F6-CC3D-D444-BC74-B0BFD73CADC1}" type="datetimeFigureOut">
               <a:rPr lang="en-US" smtClean="0"/>
-              <a:t>1/16/17</a:t>
+              <a:t>2/27/17</a:t>
             </a:fld>
             <a:endParaRPr lang="en-US"/>
           </a:p>
@@ -852,7 +853,7 @@
           <a:p>
             <a:fld id="{51BE259D-73B4-BE4F-B370-4EF591E94350}" type="datetimeFigureOut">
               <a:rPr lang="en-US" smtClean="0"/>
-              <a:t>1/16/17</a:t>
+              <a:t>2/27/17</a:t>
             </a:fld>
             <a:endParaRPr lang="en-US"/>
           </a:p>
@@ -1022,7 +1023,7 @@
           <a:p>
             <a:fld id="{51BE259D-73B4-BE4F-B370-4EF591E94350}" type="datetimeFigureOut">
               <a:rPr lang="en-US" smtClean="0"/>
-              <a:t>1/16/17</a:t>
+              <a:t>2/27/17</a:t>
             </a:fld>
             <a:endParaRPr lang="en-US"/>
           </a:p>
@@ -1202,7 +1203,7 @@
           <a:p>
             <a:fld id="{51BE259D-73B4-BE4F-B370-4EF591E94350}" type="datetimeFigureOut">
               <a:rPr lang="en-US" smtClean="0"/>
-              <a:t>1/16/17</a:t>
+              <a:t>2/27/17</a:t>
             </a:fld>
             <a:endParaRPr lang="en-US"/>
           </a:p>
@@ -1372,7 +1373,7 @@
           <a:p>
             <a:fld id="{51BE259D-73B4-BE4F-B370-4EF591E94350}" type="datetimeFigureOut">
               <a:rPr lang="en-US" smtClean="0"/>
-              <a:t>1/16/17</a:t>
+              <a:t>2/27/17</a:t>
             </a:fld>
             <a:endParaRPr lang="en-US"/>
           </a:p>
@@ -1618,7 +1619,7 @@
           <a:p>
             <a:fld id="{51BE259D-73B4-BE4F-B370-4EF591E94350}" type="datetimeFigureOut">
               <a:rPr lang="en-US" smtClean="0"/>
-              <a:t>1/16/17</a:t>
+              <a:t>2/27/17</a:t>
             </a:fld>
             <a:endParaRPr lang="en-US"/>
           </a:p>
@@ -1850,7 +1851,7 @@
           <a:p>
             <a:fld id="{51BE259D-73B4-BE4F-B370-4EF591E94350}" type="datetimeFigureOut">
               <a:rPr lang="en-US" smtClean="0"/>
-              <a:t>1/16/17</a:t>
+              <a:t>2/27/17</a:t>
             </a:fld>
             <a:endParaRPr lang="en-US"/>
           </a:p>
@@ -2217,7 +2218,7 @@
           <a:p>
             <a:fld id="{51BE259D-73B4-BE4F-B370-4EF591E94350}" type="datetimeFigureOut">
               <a:rPr lang="en-US" smtClean="0"/>
-              <a:t>1/16/17</a:t>
+              <a:t>2/27/17</a:t>
             </a:fld>
             <a:endParaRPr lang="en-US"/>
           </a:p>
@@ -2335,7 +2336,7 @@
           <a:p>
             <a:fld id="{51BE259D-73B4-BE4F-B370-4EF591E94350}" type="datetimeFigureOut">
               <a:rPr lang="en-US" smtClean="0"/>
-              <a:t>1/16/17</a:t>
+              <a:t>2/27/17</a:t>
             </a:fld>
             <a:endParaRPr lang="en-US"/>
           </a:p>
@@ -2430,7 +2431,7 @@
           <a:p>
             <a:fld id="{51BE259D-73B4-BE4F-B370-4EF591E94350}" type="datetimeFigureOut">
               <a:rPr lang="en-US" smtClean="0"/>
-              <a:t>1/16/17</a:t>
+              <a:t>2/27/17</a:t>
             </a:fld>
             <a:endParaRPr lang="en-US"/>
           </a:p>
@@ -2707,7 +2708,7 @@
           <a:p>
             <a:fld id="{51BE259D-73B4-BE4F-B370-4EF591E94350}" type="datetimeFigureOut">
               <a:rPr lang="en-US" smtClean="0"/>
-              <a:t>1/16/17</a:t>
+              <a:t>2/27/17</a:t>
             </a:fld>
             <a:endParaRPr lang="en-US"/>
           </a:p>
@@ -2960,7 +2961,7 @@
           <a:p>
             <a:fld id="{51BE259D-73B4-BE4F-B370-4EF591E94350}" type="datetimeFigureOut">
               <a:rPr lang="en-US" smtClean="0"/>
-              <a:t>1/16/17</a:t>
+              <a:t>2/27/17</a:t>
             </a:fld>
             <a:endParaRPr lang="en-US"/>
           </a:p>
@@ -3173,7 +3174,7 @@
           <a:p>
             <a:fld id="{51BE259D-73B4-BE4F-B370-4EF591E94350}" type="datetimeFigureOut">
               <a:rPr lang="en-US" smtClean="0"/>
-              <a:t>1/16/17</a:t>
+              <a:t>2/27/17</a:t>
             </a:fld>
             <a:endParaRPr lang="en-US"/>
           </a:p>
@@ -7424,13 +7425,8 @@
           <a:p>
             <a:r>
               <a:rPr lang="en-US" sz="1400" dirty="0" smtClean="0"/>
-              <a:t>Feature </a:t>
-            </a:r>
-            <a:r>
-              <a:rPr lang="en-US" sz="1400" dirty="0" smtClean="0"/>
-              <a:t>2</a:t>
-            </a:r>
-            <a:endParaRPr lang="en-US" sz="1400" dirty="0" smtClean="0"/>
+              <a:t>Feature 2</a:t>
+            </a:r>
           </a:p>
         </p:txBody>
       </p:sp>
@@ -8125,6 +8121,612 @@
     <p:extLst>
       <p:ext uri="{BB962C8B-B14F-4D97-AF65-F5344CB8AC3E}">
         <p14:creationId xmlns:p14="http://schemas.microsoft.com/office/powerpoint/2010/main" val="564087549"/>
+      </p:ext>
+    </p:extLst>
+  </p:cSld>
+  <p:clrMapOvr>
+    <a:masterClrMapping/>
+  </p:clrMapOvr>
+</p:sld>
+</file>
+
+<file path=ppt/slides/slide6.xml><?xml version="1.0" encoding="utf-8"?>
+<p:sld xmlns:a="http://schemas.openxmlformats.org/drawingml/2006/main" xmlns:r="http://schemas.openxmlformats.org/officeDocument/2006/relationships" xmlns:p="http://schemas.openxmlformats.org/presentationml/2006/main">
+  <p:cSld>
+    <p:spTree>
+      <p:nvGrpSpPr>
+        <p:cNvPr id="1" name=""/>
+        <p:cNvGrpSpPr/>
+        <p:nvPr/>
+      </p:nvGrpSpPr>
+      <p:grpSpPr>
+        <a:xfrm>
+          <a:off x="0" y="0"/>
+          <a:ext cx="0" cy="0"/>
+          <a:chOff x="0" y="0"/>
+          <a:chExt cx="0" cy="0"/>
+        </a:xfrm>
+      </p:grpSpPr>
+      <p:sp>
+        <p:nvSpPr>
+          <p:cNvPr id="4" name="Rectangle 3"/>
+          <p:cNvSpPr/>
+          <p:nvPr/>
+        </p:nvSpPr>
+        <p:spPr>
+          <a:xfrm>
+            <a:off x="1619675" y="397884"/>
+            <a:ext cx="1241224" cy="457593"/>
+          </a:xfrm>
+          <a:prstGeom prst="rect">
+            <a:avLst/>
+          </a:prstGeom>
+          <a:solidFill>
+            <a:schemeClr val="accent4">
+              <a:lumMod val="75000"/>
+            </a:schemeClr>
+          </a:solidFill>
+        </p:spPr>
+        <p:style>
+          <a:lnRef idx="2">
+            <a:schemeClr val="accent1">
+              <a:shade val="50000"/>
+            </a:schemeClr>
+          </a:lnRef>
+          <a:fillRef idx="1">
+            <a:schemeClr val="accent1"/>
+          </a:fillRef>
+          <a:effectRef idx="0">
+            <a:schemeClr val="accent1"/>
+          </a:effectRef>
+          <a:fontRef idx="minor">
+            <a:schemeClr val="lt1"/>
+          </a:fontRef>
+        </p:style>
+        <p:txBody>
+          <a:bodyPr rtlCol="0" anchor="ctr"/>
+          <a:lstStyle/>
+          <a:p>
+            <a:pPr algn="ctr"/>
+            <a:r>
+              <a:rPr lang="en-US" sz="1400" dirty="0" smtClean="0"/>
+              <a:t>Query</a:t>
+            </a:r>
+          </a:p>
+          <a:p>
+            <a:pPr algn="ctr"/>
+            <a:r>
+              <a:rPr lang="en-US" sz="800" dirty="0" smtClean="0"/>
+              <a:t>+ </a:t>
+            </a:r>
+            <a:r>
+              <a:rPr lang="en-US" sz="800" dirty="0" smtClean="0"/>
+              <a:t>metadata (Paging)</a:t>
+            </a:r>
+            <a:endParaRPr lang="en-US" sz="800" dirty="0" smtClean="0"/>
+          </a:p>
+        </p:txBody>
+      </p:sp>
+      <p:sp>
+        <p:nvSpPr>
+          <p:cNvPr id="5" name="Rectangle 4"/>
+          <p:cNvSpPr/>
+          <p:nvPr/>
+        </p:nvSpPr>
+        <p:spPr>
+          <a:xfrm>
+            <a:off x="1519779" y="1079349"/>
+            <a:ext cx="1441016" cy="3668229"/>
+          </a:xfrm>
+          <a:prstGeom prst="rect">
+            <a:avLst/>
+          </a:prstGeom>
+          <a:noFill/>
+          <a:ln>
+            <a:solidFill>
+              <a:schemeClr val="bg2">
+                <a:lumMod val="75000"/>
+              </a:schemeClr>
+            </a:solidFill>
+            <a:prstDash val="sysDash"/>
+          </a:ln>
+        </p:spPr>
+        <p:style>
+          <a:lnRef idx="2">
+            <a:schemeClr val="accent1">
+              <a:shade val="50000"/>
+            </a:schemeClr>
+          </a:lnRef>
+          <a:fillRef idx="1">
+            <a:schemeClr val="accent1"/>
+          </a:fillRef>
+          <a:effectRef idx="0">
+            <a:schemeClr val="accent1"/>
+          </a:effectRef>
+          <a:fontRef idx="minor">
+            <a:schemeClr val="lt1"/>
+          </a:fontRef>
+        </p:style>
+        <p:txBody>
+          <a:bodyPr rtlCol="0" anchor="t" anchorCtr="0"/>
+          <a:lstStyle/>
+          <a:p>
+            <a:r>
+              <a:rPr lang="en-US" sz="1400" dirty="0" smtClean="0">
+                <a:solidFill>
+                  <a:schemeClr val="bg2">
+                    <a:lumMod val="75000"/>
+                  </a:schemeClr>
+                </a:solidFill>
+              </a:rPr>
+              <a:t>Server</a:t>
+            </a:r>
+          </a:p>
+          <a:p>
+            <a:r>
+              <a:rPr lang="en-US" sz="1400" dirty="0" smtClean="0">
+                <a:solidFill>
+                  <a:schemeClr val="bg2">
+                    <a:lumMod val="75000"/>
+                  </a:schemeClr>
+                </a:solidFill>
+              </a:rPr>
+              <a:t>Read</a:t>
+            </a:r>
+            <a:endParaRPr lang="en-US" sz="1400" dirty="0">
+              <a:solidFill>
+                <a:schemeClr val="bg2">
+                  <a:lumMod val="75000"/>
+                </a:schemeClr>
+              </a:solidFill>
+            </a:endParaRPr>
+          </a:p>
+        </p:txBody>
+      </p:sp>
+      <p:sp>
+        <p:nvSpPr>
+          <p:cNvPr id="6" name="Rectangle 5"/>
+          <p:cNvSpPr/>
+          <p:nvPr/>
+        </p:nvSpPr>
+        <p:spPr>
+          <a:xfrm>
+            <a:off x="1619675" y="3678031"/>
+            <a:ext cx="1241224" cy="457593"/>
+          </a:xfrm>
+          <a:prstGeom prst="rect">
+            <a:avLst/>
+          </a:prstGeom>
+        </p:spPr>
+        <p:style>
+          <a:lnRef idx="2">
+            <a:schemeClr val="accent1">
+              <a:shade val="50000"/>
+            </a:schemeClr>
+          </a:lnRef>
+          <a:fillRef idx="1">
+            <a:schemeClr val="accent1"/>
+          </a:fillRef>
+          <a:effectRef idx="0">
+            <a:schemeClr val="accent1"/>
+          </a:effectRef>
+          <a:fontRef idx="minor">
+            <a:schemeClr val="lt1"/>
+          </a:fontRef>
+        </p:style>
+        <p:txBody>
+          <a:bodyPr rtlCol="0" anchor="ctr"/>
+          <a:lstStyle/>
+          <a:p>
+            <a:pPr algn="ctr"/>
+            <a:r>
+              <a:rPr lang="en-US" sz="1400" dirty="0" err="1" smtClean="0"/>
+              <a:t>ReadModel</a:t>
+            </a:r>
+            <a:endParaRPr lang="en-US" sz="1400" dirty="0" smtClean="0"/>
+          </a:p>
+        </p:txBody>
+      </p:sp>
+      <p:sp>
+        <p:nvSpPr>
+          <p:cNvPr id="7" name="Rectangle 6"/>
+          <p:cNvSpPr/>
+          <p:nvPr/>
+        </p:nvSpPr>
+        <p:spPr>
+          <a:xfrm>
+            <a:off x="1625771" y="3159095"/>
+            <a:ext cx="1241224" cy="457593"/>
+          </a:xfrm>
+          <a:prstGeom prst="rect">
+            <a:avLst/>
+          </a:prstGeom>
+        </p:spPr>
+        <p:style>
+          <a:lnRef idx="2">
+            <a:schemeClr val="accent1">
+              <a:shade val="50000"/>
+            </a:schemeClr>
+          </a:lnRef>
+          <a:fillRef idx="1">
+            <a:schemeClr val="accent1"/>
+          </a:fillRef>
+          <a:effectRef idx="0">
+            <a:schemeClr val="accent1"/>
+          </a:effectRef>
+          <a:fontRef idx="minor">
+            <a:schemeClr val="lt1"/>
+          </a:fontRef>
+        </p:style>
+        <p:txBody>
+          <a:bodyPr rtlCol="0" anchor="ctr"/>
+          <a:lstStyle/>
+          <a:p>
+            <a:pPr algn="ctr"/>
+            <a:r>
+              <a:rPr lang="en-US" sz="1400" dirty="0" smtClean="0"/>
+              <a:t>Query</a:t>
+            </a:r>
+          </a:p>
+        </p:txBody>
+      </p:sp>
+      <p:sp>
+        <p:nvSpPr>
+          <p:cNvPr id="8" name="Rectangle 7"/>
+          <p:cNvSpPr/>
+          <p:nvPr/>
+        </p:nvSpPr>
+        <p:spPr>
+          <a:xfrm>
+            <a:off x="1619675" y="1592840"/>
+            <a:ext cx="1241224" cy="457593"/>
+          </a:xfrm>
+          <a:prstGeom prst="rect">
+            <a:avLst/>
+          </a:prstGeom>
+          <a:solidFill>
+            <a:schemeClr val="accent2">
+              <a:lumMod val="75000"/>
+            </a:schemeClr>
+          </a:solidFill>
+        </p:spPr>
+        <p:style>
+          <a:lnRef idx="2">
+            <a:schemeClr val="accent1">
+              <a:shade val="50000"/>
+            </a:schemeClr>
+          </a:lnRef>
+          <a:fillRef idx="1">
+            <a:schemeClr val="accent1"/>
+          </a:fillRef>
+          <a:effectRef idx="0">
+            <a:schemeClr val="accent1"/>
+          </a:effectRef>
+          <a:fontRef idx="minor">
+            <a:schemeClr val="lt1"/>
+          </a:fontRef>
+        </p:style>
+        <p:txBody>
+          <a:bodyPr rtlCol="0" anchor="ctr"/>
+          <a:lstStyle/>
+          <a:p>
+            <a:pPr algn="ctr"/>
+            <a:r>
+              <a:rPr lang="en-US" sz="1400" dirty="0" smtClean="0"/>
+              <a:t>Query Coordinator</a:t>
+            </a:r>
+            <a:endParaRPr lang="en-US" sz="800" dirty="0"/>
+          </a:p>
+        </p:txBody>
+      </p:sp>
+      <p:sp>
+        <p:nvSpPr>
+          <p:cNvPr id="9" name="Rectangle 8"/>
+          <p:cNvSpPr/>
+          <p:nvPr/>
+        </p:nvSpPr>
+        <p:spPr>
+          <a:xfrm>
+            <a:off x="1619675" y="2121223"/>
+            <a:ext cx="1241224" cy="457593"/>
+          </a:xfrm>
+          <a:prstGeom prst="rect">
+            <a:avLst/>
+          </a:prstGeom>
+        </p:spPr>
+        <p:style>
+          <a:lnRef idx="2">
+            <a:schemeClr val="accent1">
+              <a:shade val="50000"/>
+            </a:schemeClr>
+          </a:lnRef>
+          <a:fillRef idx="1">
+            <a:schemeClr val="accent1"/>
+          </a:fillRef>
+          <a:effectRef idx="0">
+            <a:schemeClr val="accent1"/>
+          </a:effectRef>
+          <a:fontRef idx="minor">
+            <a:schemeClr val="lt1"/>
+          </a:fontRef>
+        </p:style>
+        <p:txBody>
+          <a:bodyPr rtlCol="0" anchor="ctr"/>
+          <a:lstStyle/>
+          <a:p>
+            <a:pPr algn="ctr"/>
+            <a:r>
+              <a:rPr lang="en-US" sz="1050" dirty="0" smtClean="0"/>
+              <a:t>Query Security Descriptor</a:t>
+            </a:r>
+          </a:p>
+        </p:txBody>
+      </p:sp>
+      <p:sp>
+        <p:nvSpPr>
+          <p:cNvPr id="10" name="Rectangle 9"/>
+          <p:cNvSpPr/>
+          <p:nvPr/>
+        </p:nvSpPr>
+        <p:spPr>
+          <a:xfrm>
+            <a:off x="1619675" y="2640159"/>
+            <a:ext cx="1241224" cy="457593"/>
+          </a:xfrm>
+          <a:prstGeom prst="rect">
+            <a:avLst/>
+          </a:prstGeom>
+        </p:spPr>
+        <p:style>
+          <a:lnRef idx="2">
+            <a:schemeClr val="accent1">
+              <a:shade val="50000"/>
+            </a:schemeClr>
+          </a:lnRef>
+          <a:fillRef idx="1">
+            <a:schemeClr val="accent1"/>
+          </a:fillRef>
+          <a:effectRef idx="0">
+            <a:schemeClr val="accent1"/>
+          </a:effectRef>
+          <a:fontRef idx="minor">
+            <a:schemeClr val="lt1"/>
+          </a:fontRef>
+        </p:style>
+        <p:txBody>
+          <a:bodyPr rtlCol="0" anchor="ctr"/>
+          <a:lstStyle/>
+          <a:p>
+            <a:pPr algn="ctr"/>
+            <a:r>
+              <a:rPr lang="en-US" sz="1050" dirty="0" smtClean="0"/>
+              <a:t>Query Input Validator</a:t>
+            </a:r>
+          </a:p>
+        </p:txBody>
+      </p:sp>
+      <p:sp>
+        <p:nvSpPr>
+          <p:cNvPr id="11" name="Can 10"/>
+          <p:cNvSpPr/>
+          <p:nvPr/>
+        </p:nvSpPr>
+        <p:spPr>
+          <a:xfrm>
+            <a:off x="1831855" y="4910349"/>
+            <a:ext cx="816864" cy="999744"/>
+          </a:xfrm>
+          <a:prstGeom prst="can">
+            <a:avLst/>
+          </a:prstGeom>
+        </p:spPr>
+        <p:style>
+          <a:lnRef idx="2">
+            <a:schemeClr val="accent1">
+              <a:shade val="50000"/>
+            </a:schemeClr>
+          </a:lnRef>
+          <a:fillRef idx="1">
+            <a:schemeClr val="accent1"/>
+          </a:fillRef>
+          <a:effectRef idx="0">
+            <a:schemeClr val="accent1"/>
+          </a:effectRef>
+          <a:fontRef idx="minor">
+            <a:schemeClr val="lt1"/>
+          </a:fontRef>
+        </p:style>
+        <p:txBody>
+          <a:bodyPr rtlCol="0" anchor="ctr"/>
+          <a:lstStyle/>
+          <a:p>
+            <a:pPr algn="ctr"/>
+            <a:r>
+              <a:rPr lang="en-US" sz="1600" dirty="0" smtClean="0"/>
+              <a:t>Read Models</a:t>
+            </a:r>
+            <a:endParaRPr lang="en-US" sz="1600" dirty="0"/>
+          </a:p>
+        </p:txBody>
+      </p:sp>
+      <p:cxnSp>
+        <p:nvCxnSpPr>
+          <p:cNvPr id="12" name="Straight Arrow Connector 11"/>
+          <p:cNvCxnSpPr>
+            <a:stCxn id="9" idx="2"/>
+          </p:cNvCxnSpPr>
+          <p:nvPr/>
+        </p:nvCxnSpPr>
+        <p:spPr>
+          <a:xfrm>
+            <a:off x="2240287" y="855477"/>
+            <a:ext cx="0" cy="737363"/>
+          </a:xfrm>
+          <a:prstGeom prst="straightConnector1">
+            <a:avLst/>
+          </a:prstGeom>
+          <a:ln>
+            <a:headEnd type="triangle"/>
+            <a:tailEnd type="triangle"/>
+          </a:ln>
+        </p:spPr>
+        <p:style>
+          <a:lnRef idx="1">
+            <a:schemeClr val="accent1"/>
+          </a:lnRef>
+          <a:fillRef idx="0">
+            <a:schemeClr val="accent1"/>
+          </a:fillRef>
+          <a:effectRef idx="0">
+            <a:schemeClr val="accent1"/>
+          </a:effectRef>
+          <a:fontRef idx="minor">
+            <a:schemeClr val="tx1"/>
+          </a:fontRef>
+        </p:style>
+      </p:cxnSp>
+      <p:sp>
+        <p:nvSpPr>
+          <p:cNvPr id="13" name="Rectangle 12"/>
+          <p:cNvSpPr/>
+          <p:nvPr/>
+        </p:nvSpPr>
+        <p:spPr>
+          <a:xfrm>
+            <a:off x="1619675" y="4200969"/>
+            <a:ext cx="1241224" cy="457593"/>
+          </a:xfrm>
+          <a:prstGeom prst="rect">
+            <a:avLst/>
+          </a:prstGeom>
+          <a:solidFill>
+            <a:schemeClr val="accent2">
+              <a:lumMod val="60000"/>
+              <a:lumOff val="40000"/>
+            </a:schemeClr>
+          </a:solidFill>
+        </p:spPr>
+        <p:style>
+          <a:lnRef idx="2">
+            <a:schemeClr val="accent1">
+              <a:shade val="50000"/>
+            </a:schemeClr>
+          </a:lnRef>
+          <a:fillRef idx="1">
+            <a:schemeClr val="accent1"/>
+          </a:fillRef>
+          <a:effectRef idx="0">
+            <a:schemeClr val="accent1"/>
+          </a:effectRef>
+          <a:fontRef idx="minor">
+            <a:schemeClr val="lt1"/>
+          </a:fontRef>
+        </p:style>
+        <p:txBody>
+          <a:bodyPr rtlCol="0" anchor="ctr"/>
+          <a:lstStyle/>
+          <a:p>
+            <a:pPr algn="ctr"/>
+            <a:r>
+              <a:rPr lang="en-US" sz="1400" smtClean="0"/>
+              <a:t>QueryProvider</a:t>
+            </a:r>
+            <a:endParaRPr lang="en-US" sz="1400" dirty="0" smtClean="0"/>
+          </a:p>
+        </p:txBody>
+      </p:sp>
+      <p:sp>
+        <p:nvSpPr>
+          <p:cNvPr id="14" name="Snip Single Corner Rectangle 13"/>
+          <p:cNvSpPr/>
+          <p:nvPr/>
+        </p:nvSpPr>
+        <p:spPr>
+          <a:xfrm>
+            <a:off x="3165231" y="4141375"/>
+            <a:ext cx="1125416" cy="656369"/>
+          </a:xfrm>
+          <a:prstGeom prst="snip1Rect">
+            <a:avLst/>
+          </a:prstGeom>
+          <a:solidFill>
+            <a:srgbClr val="FFFF00"/>
+          </a:solidFill>
+        </p:spPr>
+        <p:style>
+          <a:lnRef idx="2">
+            <a:schemeClr val="accent1">
+              <a:shade val="50000"/>
+            </a:schemeClr>
+          </a:lnRef>
+          <a:fillRef idx="1">
+            <a:schemeClr val="accent1"/>
+          </a:fillRef>
+          <a:effectRef idx="0">
+            <a:schemeClr val="accent1"/>
+          </a:effectRef>
+          <a:fontRef idx="minor">
+            <a:schemeClr val="lt1"/>
+          </a:fontRef>
+        </p:style>
+        <p:txBody>
+          <a:bodyPr rtlCol="0" anchor="ctr"/>
+          <a:lstStyle/>
+          <a:p>
+            <a:pPr algn="ctr"/>
+            <a:r>
+              <a:rPr lang="en-US" sz="1200" dirty="0" smtClean="0">
+                <a:solidFill>
+                  <a:schemeClr val="tx1"/>
+                </a:solidFill>
+              </a:rPr>
+              <a:t>Deal with cross cutting concerns</a:t>
+            </a:r>
+            <a:endParaRPr lang="en-US" sz="1200" dirty="0">
+              <a:solidFill>
+                <a:schemeClr val="tx1"/>
+              </a:solidFill>
+            </a:endParaRPr>
+          </a:p>
+        </p:txBody>
+      </p:sp>
+      <p:cxnSp>
+        <p:nvCxnSpPr>
+          <p:cNvPr id="16" name="Straight Connector 15"/>
+          <p:cNvCxnSpPr>
+            <a:stCxn id="13" idx="3"/>
+            <a:endCxn id="14" idx="2"/>
+          </p:cNvCxnSpPr>
+          <p:nvPr/>
+        </p:nvCxnSpPr>
+        <p:spPr>
+          <a:xfrm>
+            <a:off x="2860899" y="4429766"/>
+            <a:ext cx="304332" cy="39794"/>
+          </a:xfrm>
+          <a:prstGeom prst="line">
+            <a:avLst/>
+          </a:prstGeom>
+        </p:spPr>
+        <p:style>
+          <a:lnRef idx="1">
+            <a:schemeClr val="dk1"/>
+          </a:lnRef>
+          <a:fillRef idx="0">
+            <a:schemeClr val="dk1"/>
+          </a:fillRef>
+          <a:effectRef idx="0">
+            <a:schemeClr val="dk1"/>
+          </a:effectRef>
+          <a:fontRef idx="minor">
+            <a:schemeClr val="tx1"/>
+          </a:fontRef>
+        </p:style>
+      </p:cxnSp>
+    </p:spTree>
+    <p:extLst>
+      <p:ext uri="{BB962C8B-B14F-4D97-AF65-F5344CB8AC3E}">
+        <p14:creationId xmlns:p14="http://schemas.microsoft.com/office/powerpoint/2010/main" val="277228934"/>
       </p:ext>
     </p:extLst>
   </p:cSld>

</xml_diff>